<commit_message>
sunum hazirligi devam ediyor
</commit_message>
<xml_diff>
--- a/tik/tikMay2018.pptx
+++ b/tik/tikMay2018.pptx
@@ -5,7 +5,7 @@
     <p:sldMasterId id="2147483736" r:id="rId1"/>
   </p:sldMasterIdLst>
   <p:notesMasterIdLst>
-    <p:notesMasterId r:id="rId7"/>
+    <p:notesMasterId r:id="rId12"/>
   </p:notesMasterIdLst>
   <p:sldIdLst>
     <p:sldId id="256" r:id="rId2"/>
@@ -13,6 +13,11 @@
     <p:sldId id="258" r:id="rId4"/>
     <p:sldId id="259" r:id="rId5"/>
     <p:sldId id="260" r:id="rId6"/>
+    <p:sldId id="261" r:id="rId7"/>
+    <p:sldId id="262" r:id="rId8"/>
+    <p:sldId id="263" r:id="rId9"/>
+    <p:sldId id="264" r:id="rId10"/>
+    <p:sldId id="265" r:id="rId11"/>
   </p:sldIdLst>
   <p:sldSz cx="12192000" cy="6858000"/>
   <p:notesSz cx="6858000" cy="9144000"/>
@@ -113,7 +118,7 @@
   </p:defaultTextStyle>
   <p:extLst>
     <p:ext uri="{EFAFB233-063F-42B5-8137-9DF3F51BA10A}">
-      <p15:sldGuideLst xmlns:p15="http://schemas.microsoft.com/office/powerpoint/2012/main" xmlns=""/>
+      <p15:sldGuideLst xmlns="" xmlns:p15="http://schemas.microsoft.com/office/powerpoint/2012/main"/>
     </p:ext>
   </p:extLst>
 </p:presentation>
@@ -202,7 +207,7 @@
             <a:fld id="{98E9BDF3-7CC5-4B3F-A78E-C9A90CED9F04}" type="datetimeFigureOut">
               <a:rPr lang="en-US" smtClean="0"/>
               <a:pPr/>
-              <a:t>19-05-18</a:t>
+              <a:t>21-05-18</a:t>
             </a:fld>
             <a:endParaRPr lang="en-US"/>
           </a:p>
@@ -371,7 +376,7 @@
     </p:spTree>
     <p:extLst>
       <p:ext uri="{BB962C8B-B14F-4D97-AF65-F5344CB8AC3E}">
-        <p14:creationId xmlns:p14="http://schemas.microsoft.com/office/powerpoint/2010/main" xmlns="" val="430676809"/>
+        <p14:creationId xmlns="" xmlns:p14="http://schemas.microsoft.com/office/powerpoint/2010/main" val="430676809"/>
       </p:ext>
     </p:extLst>
   </p:cSld>
@@ -782,6 +787,573 @@
 </p:notes>
 </file>
 
+<file path=ppt/notesSlides/notesSlide3.xml><?xml version="1.0" encoding="utf-8"?>
+<p:notes xmlns:a="http://schemas.openxmlformats.org/drawingml/2006/main" xmlns:r="http://schemas.openxmlformats.org/officeDocument/2006/relationships" xmlns:p="http://schemas.openxmlformats.org/presentationml/2006/main">
+  <p:cSld>
+    <p:spTree>
+      <p:nvGrpSpPr>
+        <p:cNvPr id="1" name=""/>
+        <p:cNvGrpSpPr/>
+        <p:nvPr/>
+      </p:nvGrpSpPr>
+      <p:grpSpPr>
+        <a:xfrm>
+          <a:off x="0" y="0"/>
+          <a:ext cx="0" cy="0"/>
+          <a:chOff x="0" y="0"/>
+          <a:chExt cx="0" cy="0"/>
+        </a:xfrm>
+      </p:grpSpPr>
+      <p:sp>
+        <p:nvSpPr>
+          <p:cNvPr id="2" name="Slide Image Placeholder 1"/>
+          <p:cNvSpPr>
+            <a:spLocks noGrp="1" noRot="1" noChangeAspect="1"/>
+          </p:cNvSpPr>
+          <p:nvPr>
+            <p:ph type="sldImg"/>
+          </p:nvPr>
+        </p:nvSpPr>
+        <p:spPr/>
+      </p:sp>
+      <p:sp>
+        <p:nvSpPr>
+          <p:cNvPr id="3" name="Notes Placeholder 2"/>
+          <p:cNvSpPr>
+            <a:spLocks noGrp="1"/>
+          </p:cNvSpPr>
+          <p:nvPr>
+            <p:ph type="body" idx="1"/>
+          </p:nvPr>
+        </p:nvSpPr>
+        <p:spPr/>
+        <p:txBody>
+          <a:bodyPr/>
+          <a:lstStyle/>
+          <a:p>
+            <a:r>
+              <a:rPr lang="tr-TR" dirty="0" smtClean="0"/>
+              <a:t>Reference:</a:t>
+            </a:r>
+            <a:r>
+              <a:rPr lang="tr-TR" baseline="0" dirty="0" smtClean="0"/>
+              <a:t> </a:t>
+            </a:r>
+          </a:p>
+          <a:p>
+            <a:r>
+              <a:rPr lang="en-US" dirty="0" smtClean="0"/>
+              <a:t>Z. Tang and B. Akin, “Compensation of dead-time effects based on revised repetitive controller for PMSM drives,” Conf. Proc. - IEEE Appl. Power Electron. Conf. Expo. - APEC, vol. 32, no. 3, pp. 2730–2737, 2017.</a:t>
+            </a:r>
+            <a:endParaRPr lang="tr-TR" dirty="0" smtClean="0"/>
+          </a:p>
+          <a:p>
+            <a:endParaRPr lang="en-US" dirty="0"/>
+          </a:p>
+        </p:txBody>
+      </p:sp>
+      <p:sp>
+        <p:nvSpPr>
+          <p:cNvPr id="4" name="Slide Number Placeholder 3"/>
+          <p:cNvSpPr>
+            <a:spLocks noGrp="1"/>
+          </p:cNvSpPr>
+          <p:nvPr>
+            <p:ph type="sldNum" sz="quarter" idx="10"/>
+          </p:nvPr>
+        </p:nvSpPr>
+        <p:spPr/>
+        <p:txBody>
+          <a:bodyPr/>
+          <a:lstStyle/>
+          <a:p>
+            <a:fld id="{85B3D0A3-69DF-49D9-A27C-44C8B4ABFA58}" type="slidenum">
+              <a:rPr lang="en-US" smtClean="0"/>
+              <a:pPr/>
+              <a:t>5</a:t>
+            </a:fld>
+            <a:endParaRPr lang="en-US"/>
+          </a:p>
+        </p:txBody>
+      </p:sp>
+    </p:spTree>
+    <p:extLst>
+      <p:ext uri="{BB962C8B-B14F-4D97-AF65-F5344CB8AC3E}">
+        <p14:creationId xmlns:p14="http://schemas.microsoft.com/office/powerpoint/2010/main" xmlns="" val="3800693545"/>
+      </p:ext>
+    </p:extLst>
+  </p:cSld>
+  <p:clrMapOvr>
+    <a:masterClrMapping/>
+  </p:clrMapOvr>
+</p:notes>
+</file>
+
+<file path=ppt/notesSlides/notesSlide4.xml><?xml version="1.0" encoding="utf-8"?>
+<p:notes xmlns:a="http://schemas.openxmlformats.org/drawingml/2006/main" xmlns:r="http://schemas.openxmlformats.org/officeDocument/2006/relationships" xmlns:p="http://schemas.openxmlformats.org/presentationml/2006/main">
+  <p:cSld>
+    <p:spTree>
+      <p:nvGrpSpPr>
+        <p:cNvPr id="1" name=""/>
+        <p:cNvGrpSpPr/>
+        <p:nvPr/>
+      </p:nvGrpSpPr>
+      <p:grpSpPr>
+        <a:xfrm>
+          <a:off x="0" y="0"/>
+          <a:ext cx="0" cy="0"/>
+          <a:chOff x="0" y="0"/>
+          <a:chExt cx="0" cy="0"/>
+        </a:xfrm>
+      </p:grpSpPr>
+      <p:sp>
+        <p:nvSpPr>
+          <p:cNvPr id="2" name="Slide Image Placeholder 1"/>
+          <p:cNvSpPr>
+            <a:spLocks noGrp="1" noRot="1" noChangeAspect="1"/>
+          </p:cNvSpPr>
+          <p:nvPr>
+            <p:ph type="sldImg"/>
+          </p:nvPr>
+        </p:nvSpPr>
+        <p:spPr/>
+      </p:sp>
+      <p:sp>
+        <p:nvSpPr>
+          <p:cNvPr id="3" name="Notes Placeholder 2"/>
+          <p:cNvSpPr>
+            <a:spLocks noGrp="1"/>
+          </p:cNvSpPr>
+          <p:nvPr>
+            <p:ph type="body" idx="1"/>
+          </p:nvPr>
+        </p:nvSpPr>
+        <p:spPr/>
+        <p:txBody>
+          <a:bodyPr/>
+          <a:lstStyle/>
+          <a:p>
+            <a:pPr marL="0" marR="0" lvl="0" indent="0" algn="l" defTabSz="914400" rtl="0" eaLnBrk="1" fontAlgn="auto" latinLnBrk="0" hangingPunct="1">
+              <a:lnSpc>
+                <a:spcPct val="100000"/>
+              </a:lnSpc>
+              <a:spcBef>
+                <a:spcPts val="0"/>
+              </a:spcBef>
+              <a:spcAft>
+                <a:spcPts val="0"/>
+              </a:spcAft>
+              <a:buClrTx/>
+              <a:buSzTx/>
+              <a:buFontTx/>
+              <a:buNone/>
+              <a:tabLst/>
+              <a:defRPr/>
+            </a:pPr>
+            <a:r>
+              <a:rPr lang="tr-TR" dirty="0" smtClean="0"/>
+              <a:t>Reference:</a:t>
+            </a:r>
+            <a:r>
+              <a:rPr lang="tr-TR" baseline="0" dirty="0" smtClean="0"/>
+              <a:t> </a:t>
+            </a:r>
+          </a:p>
+          <a:p>
+            <a:pPr marL="0" marR="0" lvl="0" indent="0" algn="l" defTabSz="914400" rtl="0" eaLnBrk="1" fontAlgn="auto" latinLnBrk="0" hangingPunct="1">
+              <a:lnSpc>
+                <a:spcPct val="100000"/>
+              </a:lnSpc>
+              <a:spcBef>
+                <a:spcPts val="0"/>
+              </a:spcBef>
+              <a:spcAft>
+                <a:spcPts val="0"/>
+              </a:spcAft>
+              <a:buClrTx/>
+              <a:buSzTx/>
+              <a:buFontTx/>
+              <a:buNone/>
+              <a:tabLst/>
+              <a:defRPr/>
+            </a:pPr>
+            <a:r>
+              <a:rPr lang="en-US" sz="1200" kern="1200" dirty="0" smtClean="0">
+                <a:solidFill>
+                  <a:schemeClr val="tx1"/>
+                </a:solidFill>
+                <a:effectLst/>
+                <a:latin typeface="+mn-lt"/>
+                <a:ea typeface="+mn-ea"/>
+                <a:cs typeface="+mn-cs"/>
+              </a:rPr>
+              <a:t>Y. Wang, S. Member, W. </a:t>
+            </a:r>
+            <a:r>
+              <a:rPr lang="en-US" sz="1200" kern="1200" dirty="0" err="1" smtClean="0">
+                <a:solidFill>
+                  <a:schemeClr val="tx1"/>
+                </a:solidFill>
+                <a:effectLst/>
+                <a:latin typeface="+mn-lt"/>
+                <a:ea typeface="+mn-ea"/>
+                <a:cs typeface="+mn-cs"/>
+              </a:rPr>
+              <a:t>Xie</a:t>
+            </a:r>
+            <a:r>
+              <a:rPr lang="en-US" sz="1200" kern="1200" dirty="0" smtClean="0">
+                <a:solidFill>
+                  <a:schemeClr val="tx1"/>
+                </a:solidFill>
+                <a:effectLst/>
+                <a:latin typeface="+mn-lt"/>
+                <a:ea typeface="+mn-ea"/>
+                <a:cs typeface="+mn-cs"/>
+              </a:rPr>
+              <a:t>, and X. Wang, “Strategy for Voltage Source Inverters,” vol. 65, no. 1, pp. 59–66, 2018.</a:t>
+            </a:r>
+          </a:p>
+          <a:p>
+            <a:endParaRPr lang="en-US" dirty="0"/>
+          </a:p>
+        </p:txBody>
+      </p:sp>
+      <p:sp>
+        <p:nvSpPr>
+          <p:cNvPr id="4" name="Slide Number Placeholder 3"/>
+          <p:cNvSpPr>
+            <a:spLocks noGrp="1"/>
+          </p:cNvSpPr>
+          <p:nvPr>
+            <p:ph type="sldNum" sz="quarter" idx="10"/>
+          </p:nvPr>
+        </p:nvSpPr>
+        <p:spPr/>
+        <p:txBody>
+          <a:bodyPr/>
+          <a:lstStyle/>
+          <a:p>
+            <a:fld id="{85B3D0A3-69DF-49D9-A27C-44C8B4ABFA58}" type="slidenum">
+              <a:rPr lang="en-US" smtClean="0"/>
+              <a:pPr/>
+              <a:t>6</a:t>
+            </a:fld>
+            <a:endParaRPr lang="en-US"/>
+          </a:p>
+        </p:txBody>
+      </p:sp>
+    </p:spTree>
+    <p:extLst>
+      <p:ext uri="{BB962C8B-B14F-4D97-AF65-F5344CB8AC3E}">
+        <p14:creationId xmlns:p14="http://schemas.microsoft.com/office/powerpoint/2010/main" xmlns="" val="1575042101"/>
+      </p:ext>
+    </p:extLst>
+  </p:cSld>
+  <p:clrMapOvr>
+    <a:masterClrMapping/>
+  </p:clrMapOvr>
+</p:notes>
+</file>
+
+<file path=ppt/notesSlides/notesSlide5.xml><?xml version="1.0" encoding="utf-8"?>
+<p:notes xmlns:a="http://schemas.openxmlformats.org/drawingml/2006/main" xmlns:r="http://schemas.openxmlformats.org/officeDocument/2006/relationships" xmlns:p="http://schemas.openxmlformats.org/presentationml/2006/main">
+  <p:cSld>
+    <p:spTree>
+      <p:nvGrpSpPr>
+        <p:cNvPr id="1" name=""/>
+        <p:cNvGrpSpPr/>
+        <p:nvPr/>
+      </p:nvGrpSpPr>
+      <p:grpSpPr>
+        <a:xfrm>
+          <a:off x="0" y="0"/>
+          <a:ext cx="0" cy="0"/>
+          <a:chOff x="0" y="0"/>
+          <a:chExt cx="0" cy="0"/>
+        </a:xfrm>
+      </p:grpSpPr>
+      <p:sp>
+        <p:nvSpPr>
+          <p:cNvPr id="2" name="Slide Image Placeholder 1"/>
+          <p:cNvSpPr>
+            <a:spLocks noGrp="1" noRot="1" noChangeAspect="1"/>
+          </p:cNvSpPr>
+          <p:nvPr>
+            <p:ph type="sldImg"/>
+          </p:nvPr>
+        </p:nvSpPr>
+        <p:spPr/>
+      </p:sp>
+      <p:sp>
+        <p:nvSpPr>
+          <p:cNvPr id="3" name="Notes Placeholder 2"/>
+          <p:cNvSpPr>
+            <a:spLocks noGrp="1"/>
+          </p:cNvSpPr>
+          <p:nvPr>
+            <p:ph type="body" idx="1"/>
+          </p:nvPr>
+        </p:nvSpPr>
+        <p:spPr/>
+        <p:txBody>
+          <a:bodyPr/>
+          <a:lstStyle/>
+          <a:p>
+            <a:pPr marL="0" marR="0" lvl="0" indent="0" algn="l" defTabSz="914400" rtl="0" eaLnBrk="1" fontAlgn="auto" latinLnBrk="0" hangingPunct="1">
+              <a:lnSpc>
+                <a:spcPct val="100000"/>
+              </a:lnSpc>
+              <a:spcBef>
+                <a:spcPts val="0"/>
+              </a:spcBef>
+              <a:spcAft>
+                <a:spcPts val="0"/>
+              </a:spcAft>
+              <a:buClrTx/>
+              <a:buSzTx/>
+              <a:buFontTx/>
+              <a:buNone/>
+              <a:tabLst/>
+              <a:defRPr/>
+            </a:pPr>
+            <a:r>
+              <a:rPr lang="tr-TR" dirty="0" smtClean="0"/>
+              <a:t>Reference:</a:t>
+            </a:r>
+            <a:r>
+              <a:rPr lang="tr-TR" baseline="0" dirty="0" smtClean="0"/>
+              <a:t> </a:t>
+            </a:r>
+          </a:p>
+          <a:p>
+            <a:r>
+              <a:rPr lang="en-US" sz="1200" kern="1200" dirty="0" smtClean="0">
+                <a:solidFill>
+                  <a:schemeClr val="tx1"/>
+                </a:solidFill>
+                <a:effectLst/>
+                <a:latin typeface="+mn-lt"/>
+                <a:ea typeface="+mn-ea"/>
+                <a:cs typeface="+mn-cs"/>
+              </a:rPr>
+              <a:t>S. J. Chee, J. Kim, and S. K. </a:t>
+            </a:r>
+            <a:r>
+              <a:rPr lang="en-US" sz="1200" kern="1200" dirty="0" err="1" smtClean="0">
+                <a:solidFill>
+                  <a:schemeClr val="tx1"/>
+                </a:solidFill>
+                <a:effectLst/>
+                <a:latin typeface="+mn-lt"/>
+                <a:ea typeface="+mn-ea"/>
+                <a:cs typeface="+mn-cs"/>
+              </a:rPr>
+              <a:t>Sul</a:t>
+            </a:r>
+            <a:r>
+              <a:rPr lang="en-US" sz="1200" kern="1200" dirty="0" smtClean="0">
+                <a:solidFill>
+                  <a:schemeClr val="tx1"/>
+                </a:solidFill>
+                <a:effectLst/>
+                <a:latin typeface="+mn-lt"/>
+                <a:ea typeface="+mn-ea"/>
+                <a:cs typeface="+mn-cs"/>
+              </a:rPr>
+              <a:t>, “Dead-time compensation based on pole voltage measurement,” </a:t>
+            </a:r>
+            <a:r>
+              <a:rPr lang="en-US" sz="1200" i="1" kern="1200" dirty="0" smtClean="0">
+                <a:solidFill>
+                  <a:schemeClr val="tx1"/>
+                </a:solidFill>
+                <a:effectLst/>
+                <a:latin typeface="+mn-lt"/>
+                <a:ea typeface="+mn-ea"/>
+                <a:cs typeface="+mn-cs"/>
+              </a:rPr>
+              <a:t>2015 IEEE Energy Convers. </a:t>
+            </a:r>
+            <a:r>
+              <a:rPr lang="en-US" sz="1200" i="1" kern="1200" dirty="0" err="1" smtClean="0">
+                <a:solidFill>
+                  <a:schemeClr val="tx1"/>
+                </a:solidFill>
+                <a:effectLst/>
+                <a:latin typeface="+mn-lt"/>
+                <a:ea typeface="+mn-ea"/>
+                <a:cs typeface="+mn-cs"/>
+              </a:rPr>
+              <a:t>Congr</a:t>
+            </a:r>
+            <a:r>
+              <a:rPr lang="en-US" sz="1200" i="1" kern="1200" dirty="0" smtClean="0">
+                <a:solidFill>
+                  <a:schemeClr val="tx1"/>
+                </a:solidFill>
+                <a:effectLst/>
+                <a:latin typeface="+mn-lt"/>
+                <a:ea typeface="+mn-ea"/>
+                <a:cs typeface="+mn-cs"/>
+              </a:rPr>
+              <a:t>. Expo. ECCE 2015</a:t>
+            </a:r>
+            <a:r>
+              <a:rPr lang="en-US" sz="1200" kern="1200" dirty="0" smtClean="0">
+                <a:solidFill>
+                  <a:schemeClr val="tx1"/>
+                </a:solidFill>
+                <a:effectLst/>
+                <a:latin typeface="+mn-lt"/>
+                <a:ea typeface="+mn-ea"/>
+                <a:cs typeface="+mn-cs"/>
+              </a:rPr>
+              <a:t>, pp. 1549–1555, 2015.</a:t>
+            </a:r>
+            <a:endParaRPr lang="en-US" dirty="0"/>
+          </a:p>
+        </p:txBody>
+      </p:sp>
+      <p:sp>
+        <p:nvSpPr>
+          <p:cNvPr id="4" name="Slide Number Placeholder 3"/>
+          <p:cNvSpPr>
+            <a:spLocks noGrp="1"/>
+          </p:cNvSpPr>
+          <p:nvPr>
+            <p:ph type="sldNum" sz="quarter" idx="10"/>
+          </p:nvPr>
+        </p:nvSpPr>
+        <p:spPr/>
+        <p:txBody>
+          <a:bodyPr/>
+          <a:lstStyle/>
+          <a:p>
+            <a:fld id="{85B3D0A3-69DF-49D9-A27C-44C8B4ABFA58}" type="slidenum">
+              <a:rPr lang="en-US" smtClean="0"/>
+              <a:pPr/>
+              <a:t>7</a:t>
+            </a:fld>
+            <a:endParaRPr lang="en-US"/>
+          </a:p>
+        </p:txBody>
+      </p:sp>
+    </p:spTree>
+    <p:extLst>
+      <p:ext uri="{BB962C8B-B14F-4D97-AF65-F5344CB8AC3E}">
+        <p14:creationId xmlns:p14="http://schemas.microsoft.com/office/powerpoint/2010/main" xmlns="" val="260983234"/>
+      </p:ext>
+    </p:extLst>
+  </p:cSld>
+  <p:clrMapOvr>
+    <a:masterClrMapping/>
+  </p:clrMapOvr>
+</p:notes>
+</file>
+
+<file path=ppt/notesSlides/notesSlide6.xml><?xml version="1.0" encoding="utf-8"?>
+<p:notes xmlns:a="http://schemas.openxmlformats.org/drawingml/2006/main" xmlns:r="http://schemas.openxmlformats.org/officeDocument/2006/relationships" xmlns:p="http://schemas.openxmlformats.org/presentationml/2006/main">
+  <p:cSld>
+    <p:spTree>
+      <p:nvGrpSpPr>
+        <p:cNvPr id="1" name=""/>
+        <p:cNvGrpSpPr/>
+        <p:nvPr/>
+      </p:nvGrpSpPr>
+      <p:grpSpPr>
+        <a:xfrm>
+          <a:off x="0" y="0"/>
+          <a:ext cx="0" cy="0"/>
+          <a:chOff x="0" y="0"/>
+          <a:chExt cx="0" cy="0"/>
+        </a:xfrm>
+      </p:grpSpPr>
+      <p:sp>
+        <p:nvSpPr>
+          <p:cNvPr id="2" name="Slide Image Placeholder 1"/>
+          <p:cNvSpPr>
+            <a:spLocks noGrp="1" noRot="1" noChangeAspect="1"/>
+          </p:cNvSpPr>
+          <p:nvPr>
+            <p:ph type="sldImg"/>
+          </p:nvPr>
+        </p:nvSpPr>
+        <p:spPr/>
+      </p:sp>
+      <p:sp>
+        <p:nvSpPr>
+          <p:cNvPr id="3" name="Notes Placeholder 2"/>
+          <p:cNvSpPr>
+            <a:spLocks noGrp="1"/>
+          </p:cNvSpPr>
+          <p:nvPr>
+            <p:ph type="body" idx="1"/>
+          </p:nvPr>
+        </p:nvSpPr>
+        <p:spPr/>
+        <p:txBody>
+          <a:bodyPr/>
+          <a:lstStyle/>
+          <a:p>
+            <a:r>
+              <a:rPr lang="tr-TR" dirty="0" smtClean="0"/>
+              <a:t>Reference:</a:t>
+            </a:r>
+            <a:r>
+              <a:rPr lang="tr-TR" baseline="0" dirty="0" smtClean="0"/>
+              <a:t> </a:t>
+            </a:r>
+          </a:p>
+          <a:p>
+            <a:r>
+              <a:rPr lang="en-US" dirty="0" smtClean="0"/>
+              <a:t>Z. Tang and B. Akin, “Compensation of dead-time effects based on revised repetitive controller for PMSM drives,” Conf. Proc. - IEEE Appl. Power Electron. Conf. Expo. - APEC, vol. 32, no. 3, pp. 2730–2737, 2017.</a:t>
+            </a:r>
+            <a:endParaRPr lang="tr-TR" dirty="0" smtClean="0"/>
+          </a:p>
+          <a:p>
+            <a:endParaRPr lang="en-US" dirty="0"/>
+          </a:p>
+        </p:txBody>
+      </p:sp>
+      <p:sp>
+        <p:nvSpPr>
+          <p:cNvPr id="4" name="Slide Number Placeholder 3"/>
+          <p:cNvSpPr>
+            <a:spLocks noGrp="1"/>
+          </p:cNvSpPr>
+          <p:nvPr>
+            <p:ph type="sldNum" sz="quarter" idx="10"/>
+          </p:nvPr>
+        </p:nvSpPr>
+        <p:spPr/>
+        <p:txBody>
+          <a:bodyPr/>
+          <a:lstStyle/>
+          <a:p>
+            <a:fld id="{85B3D0A3-69DF-49D9-A27C-44C8B4ABFA58}" type="slidenum">
+              <a:rPr lang="en-US" smtClean="0"/>
+              <a:pPr/>
+              <a:t>9</a:t>
+            </a:fld>
+            <a:endParaRPr lang="en-US"/>
+          </a:p>
+        </p:txBody>
+      </p:sp>
+    </p:spTree>
+    <p:extLst>
+      <p:ext uri="{BB962C8B-B14F-4D97-AF65-F5344CB8AC3E}">
+        <p14:creationId xmlns:p14="http://schemas.microsoft.com/office/powerpoint/2010/main" xmlns="" val="661997981"/>
+      </p:ext>
+    </p:extLst>
+  </p:cSld>
+  <p:clrMapOvr>
+    <a:masterClrMapping/>
+  </p:clrMapOvr>
+</p:notes>
+</file>
+
 <file path=ppt/slideLayouts/slideLayout1.xml><?xml version="1.0" encoding="utf-8"?>
 <p:sldLayout xmlns:a="http://schemas.openxmlformats.org/drawingml/2006/main" xmlns:r="http://schemas.openxmlformats.org/officeDocument/2006/relationships" xmlns:p="http://schemas.openxmlformats.org/presentationml/2006/main" showMasterSp="0" type="title" preserve="1">
   <p:cSld name="Title Slide">
@@ -1009,7 +1581,7 @@
             <a:fld id="{3EF96EC7-A9F6-4918-BDFC-C3ED4AC79626}" type="datetimeFigureOut">
               <a:rPr lang="tr-TR" smtClean="0"/>
               <a:pPr/>
-              <a:t>19.05.2018</a:t>
+              <a:t>21.05.2018</a:t>
             </a:fld>
             <a:endParaRPr lang="tr-TR"/>
           </a:p>
@@ -1099,7 +1671,7 @@
     </p:spTree>
     <p:extLst>
       <p:ext uri="{BB962C8B-B14F-4D97-AF65-F5344CB8AC3E}">
-        <p14:creationId xmlns:p14="http://schemas.microsoft.com/office/powerpoint/2010/main" xmlns="" val="3809877250"/>
+        <p14:creationId xmlns="" xmlns:p14="http://schemas.microsoft.com/office/powerpoint/2010/main" val="3809877250"/>
       </p:ext>
     </p:extLst>
   </p:cSld>
@@ -1219,7 +1791,7 @@
             <a:fld id="{3EF96EC7-A9F6-4918-BDFC-C3ED4AC79626}" type="datetimeFigureOut">
               <a:rPr lang="tr-TR" smtClean="0"/>
               <a:pPr/>
-              <a:t>19.05.2018</a:t>
+              <a:t>21.05.2018</a:t>
             </a:fld>
             <a:endParaRPr lang="tr-TR"/>
           </a:p>
@@ -1271,7 +1843,7 @@
     </p:spTree>
     <p:extLst>
       <p:ext uri="{BB962C8B-B14F-4D97-AF65-F5344CB8AC3E}">
-        <p14:creationId xmlns:p14="http://schemas.microsoft.com/office/powerpoint/2010/main" xmlns="" val="1838678002"/>
+        <p14:creationId xmlns="" xmlns:p14="http://schemas.microsoft.com/office/powerpoint/2010/main" val="1838678002"/>
       </p:ext>
     </p:extLst>
   </p:cSld>
@@ -1477,7 +2049,7 @@
             <a:fld id="{3EF96EC7-A9F6-4918-BDFC-C3ED4AC79626}" type="datetimeFigureOut">
               <a:rPr lang="tr-TR" smtClean="0"/>
               <a:pPr/>
-              <a:t>19.05.2018</a:t>
+              <a:t>21.05.2018</a:t>
             </a:fld>
             <a:endParaRPr lang="tr-TR"/>
           </a:p>
@@ -1529,7 +2101,7 @@
     </p:spTree>
     <p:extLst>
       <p:ext uri="{BB962C8B-B14F-4D97-AF65-F5344CB8AC3E}">
-        <p14:creationId xmlns:p14="http://schemas.microsoft.com/office/powerpoint/2010/main" xmlns="" val="1477903999"/>
+        <p14:creationId xmlns="" xmlns:p14="http://schemas.microsoft.com/office/powerpoint/2010/main" val="1477903999"/>
       </p:ext>
     </p:extLst>
   </p:cSld>
@@ -1653,7 +2225,7 @@
             <a:fld id="{3EF96EC7-A9F6-4918-BDFC-C3ED4AC79626}" type="datetimeFigureOut">
               <a:rPr lang="tr-TR" smtClean="0"/>
               <a:pPr/>
-              <a:t>19.05.2018</a:t>
+              <a:t>21.05.2018</a:t>
             </a:fld>
             <a:endParaRPr lang="tr-TR"/>
           </a:p>
@@ -1705,7 +2277,7 @@
     </p:spTree>
     <p:extLst>
       <p:ext uri="{BB962C8B-B14F-4D97-AF65-F5344CB8AC3E}">
-        <p14:creationId xmlns:p14="http://schemas.microsoft.com/office/powerpoint/2010/main" xmlns="" val="2234451693"/>
+        <p14:creationId xmlns="" xmlns:p14="http://schemas.microsoft.com/office/powerpoint/2010/main" val="2234451693"/>
       </p:ext>
     </p:extLst>
   </p:cSld>
@@ -1998,7 +2570,7 @@
             <a:fld id="{3EF96EC7-A9F6-4918-BDFC-C3ED4AC79626}" type="datetimeFigureOut">
               <a:rPr lang="tr-TR" smtClean="0"/>
               <a:pPr/>
-              <a:t>19.05.2018</a:t>
+              <a:t>21.05.2018</a:t>
             </a:fld>
             <a:endParaRPr lang="tr-TR"/>
           </a:p>
@@ -2088,7 +2660,7 @@
     </p:spTree>
     <p:extLst>
       <p:ext uri="{BB962C8B-B14F-4D97-AF65-F5344CB8AC3E}">
-        <p14:creationId xmlns:p14="http://schemas.microsoft.com/office/powerpoint/2010/main" xmlns="" val="1537530343"/>
+        <p14:creationId xmlns="" xmlns:p14="http://schemas.microsoft.com/office/powerpoint/2010/main" val="1537530343"/>
       </p:ext>
     </p:extLst>
   </p:cSld>
@@ -2275,7 +2847,7 @@
             <a:fld id="{3EF96EC7-A9F6-4918-BDFC-C3ED4AC79626}" type="datetimeFigureOut">
               <a:rPr lang="tr-TR" smtClean="0"/>
               <a:pPr/>
-              <a:t>19.05.2018</a:t>
+              <a:t>21.05.2018</a:t>
             </a:fld>
             <a:endParaRPr lang="tr-TR"/>
           </a:p>
@@ -2327,7 +2899,7 @@
     </p:spTree>
     <p:extLst>
       <p:ext uri="{BB962C8B-B14F-4D97-AF65-F5344CB8AC3E}">
-        <p14:creationId xmlns:p14="http://schemas.microsoft.com/office/powerpoint/2010/main" xmlns="" val="3378874762"/>
+        <p14:creationId xmlns="" xmlns:p14="http://schemas.microsoft.com/office/powerpoint/2010/main" val="3378874762"/>
       </p:ext>
     </p:extLst>
   </p:cSld>
@@ -2656,7 +3228,7 @@
             <a:fld id="{3EF96EC7-A9F6-4918-BDFC-C3ED4AC79626}" type="datetimeFigureOut">
               <a:rPr lang="tr-TR" smtClean="0"/>
               <a:pPr/>
-              <a:t>19.05.2018</a:t>
+              <a:t>21.05.2018</a:t>
             </a:fld>
             <a:endParaRPr lang="tr-TR"/>
           </a:p>
@@ -2708,7 +3280,7 @@
     </p:spTree>
     <p:extLst>
       <p:ext uri="{BB962C8B-B14F-4D97-AF65-F5344CB8AC3E}">
-        <p14:creationId xmlns:p14="http://schemas.microsoft.com/office/powerpoint/2010/main" xmlns="" val="491547674"/>
+        <p14:creationId xmlns="" xmlns:p14="http://schemas.microsoft.com/office/powerpoint/2010/main" val="491547674"/>
       </p:ext>
     </p:extLst>
   </p:cSld>
@@ -2776,7 +3348,7 @@
             <a:fld id="{3EF96EC7-A9F6-4918-BDFC-C3ED4AC79626}" type="datetimeFigureOut">
               <a:rPr lang="tr-TR" smtClean="0"/>
               <a:pPr/>
-              <a:t>19.05.2018</a:t>
+              <a:t>21.05.2018</a:t>
             </a:fld>
             <a:endParaRPr lang="tr-TR"/>
           </a:p>
@@ -2828,7 +3400,7 @@
     </p:spTree>
     <p:extLst>
       <p:ext uri="{BB962C8B-B14F-4D97-AF65-F5344CB8AC3E}">
-        <p14:creationId xmlns:p14="http://schemas.microsoft.com/office/powerpoint/2010/main" xmlns="" val="3139254311"/>
+        <p14:creationId xmlns="" xmlns:p14="http://schemas.microsoft.com/office/powerpoint/2010/main" val="3139254311"/>
       </p:ext>
     </p:extLst>
   </p:cSld>
@@ -2949,7 +3521,7 @@
             <a:fld id="{3EF96EC7-A9F6-4918-BDFC-C3ED4AC79626}" type="datetimeFigureOut">
               <a:rPr lang="tr-TR" smtClean="0"/>
               <a:pPr/>
-              <a:t>19.05.2018</a:t>
+              <a:t>21.05.2018</a:t>
             </a:fld>
             <a:endParaRPr lang="tr-TR"/>
           </a:p>
@@ -3009,7 +3581,7 @@
     </p:spTree>
     <p:extLst>
       <p:ext uri="{BB962C8B-B14F-4D97-AF65-F5344CB8AC3E}">
-        <p14:creationId xmlns:p14="http://schemas.microsoft.com/office/powerpoint/2010/main" xmlns="" val="3912122464"/>
+        <p14:creationId xmlns="" xmlns:p14="http://schemas.microsoft.com/office/powerpoint/2010/main" val="3912122464"/>
       </p:ext>
     </p:extLst>
   </p:cSld>
@@ -3305,7 +3877,7 @@
             <a:fld id="{3EF96EC7-A9F6-4918-BDFC-C3ED4AC79626}" type="datetimeFigureOut">
               <a:rPr lang="tr-TR" smtClean="0"/>
               <a:pPr/>
-              <a:t>19.05.2018</a:t>
+              <a:t>21.05.2018</a:t>
             </a:fld>
             <a:endParaRPr lang="tr-TR"/>
           </a:p>
@@ -3378,7 +3950,7 @@
     </p:spTree>
     <p:extLst>
       <p:ext uri="{BB962C8B-B14F-4D97-AF65-F5344CB8AC3E}">
-        <p14:creationId xmlns:p14="http://schemas.microsoft.com/office/powerpoint/2010/main" xmlns="" val="2909264617"/>
+        <p14:creationId xmlns="" xmlns:p14="http://schemas.microsoft.com/office/powerpoint/2010/main" val="2909264617"/>
       </p:ext>
     </p:extLst>
   </p:cSld>
@@ -3689,7 +4261,7 @@
             <a:fld id="{3EF96EC7-A9F6-4918-BDFC-C3ED4AC79626}" type="datetimeFigureOut">
               <a:rPr lang="tr-TR" smtClean="0"/>
               <a:pPr/>
-              <a:t>19.05.2018</a:t>
+              <a:t>21.05.2018</a:t>
             </a:fld>
             <a:endParaRPr lang="tr-TR"/>
           </a:p>
@@ -3741,7 +4313,7 @@
     </p:spTree>
     <p:extLst>
       <p:ext uri="{BB962C8B-B14F-4D97-AF65-F5344CB8AC3E}">
-        <p14:creationId xmlns:p14="http://schemas.microsoft.com/office/powerpoint/2010/main" xmlns="" val="1224235102"/>
+        <p14:creationId xmlns="" xmlns:p14="http://schemas.microsoft.com/office/powerpoint/2010/main" val="1224235102"/>
       </p:ext>
     </p:extLst>
   </p:cSld>
@@ -3978,7 +4550,7 @@
             <a:fld id="{3EF96EC7-A9F6-4918-BDFC-C3ED4AC79626}" type="datetimeFigureOut">
               <a:rPr lang="tr-TR" smtClean="0"/>
               <a:pPr/>
-              <a:t>19.05.2018</a:t>
+              <a:t>21.05.2018</a:t>
             </a:fld>
             <a:endParaRPr lang="tr-TR"/>
           </a:p>
@@ -4100,7 +4672,7 @@
     </p:spTree>
     <p:extLst>
       <p:ext uri="{BB962C8B-B14F-4D97-AF65-F5344CB8AC3E}">
-        <p14:creationId xmlns:p14="http://schemas.microsoft.com/office/powerpoint/2010/main" xmlns="" val="2460612639"/>
+        <p14:creationId xmlns="" xmlns:p14="http://schemas.microsoft.com/office/powerpoint/2010/main" val="2460612639"/>
       </p:ext>
     </p:extLst>
   </p:cSld>
@@ -4569,6 +5141,181 @@
 </p:sld>
 </file>
 
+<file path=ppt/slides/slide10.xml><?xml version="1.0" encoding="utf-8"?>
+<p:sld xmlns:a="http://schemas.openxmlformats.org/drawingml/2006/main" xmlns:r="http://schemas.openxmlformats.org/officeDocument/2006/relationships" xmlns:p="http://schemas.openxmlformats.org/presentationml/2006/main">
+  <p:cSld>
+    <p:spTree>
+      <p:nvGrpSpPr>
+        <p:cNvPr id="1" name=""/>
+        <p:cNvGrpSpPr/>
+        <p:nvPr/>
+      </p:nvGrpSpPr>
+      <p:grpSpPr>
+        <a:xfrm>
+          <a:off x="0" y="0"/>
+          <a:ext cx="0" cy="0"/>
+          <a:chOff x="0" y="0"/>
+          <a:chExt cx="0" cy="0"/>
+        </a:xfrm>
+      </p:grpSpPr>
+      <p:sp>
+        <p:nvSpPr>
+          <p:cNvPr id="2" name="Title 1"/>
+          <p:cNvSpPr>
+            <a:spLocks noGrp="1"/>
+          </p:cNvSpPr>
+          <p:nvPr>
+            <p:ph type="title"/>
+          </p:nvPr>
+        </p:nvSpPr>
+        <p:spPr/>
+        <p:txBody>
+          <a:bodyPr/>
+          <a:lstStyle/>
+          <a:p>
+            <a:r>
+              <a:rPr lang="tr-TR" dirty="0" err="1" smtClean="0"/>
+              <a:t>future</a:t>
+            </a:r>
+            <a:r>
+              <a:rPr lang="tr-TR" dirty="0" smtClean="0"/>
+              <a:t> plan</a:t>
+            </a:r>
+            <a:endParaRPr lang="en-US" dirty="0"/>
+          </a:p>
+        </p:txBody>
+      </p:sp>
+      <p:sp>
+        <p:nvSpPr>
+          <p:cNvPr id="3" name="Content Placeholder 2"/>
+          <p:cNvSpPr>
+            <a:spLocks noGrp="1"/>
+          </p:cNvSpPr>
+          <p:nvPr>
+            <p:ph idx="1"/>
+          </p:nvPr>
+        </p:nvSpPr>
+        <p:spPr/>
+        <p:txBody>
+          <a:bodyPr/>
+          <a:lstStyle/>
+          <a:p>
+            <a:pPr>
+              <a:buFont typeface="Wingdings" panose="05000000000000000000" pitchFamily="2" charset="2"/>
+              <a:buChar char="q"/>
+            </a:pPr>
+            <a:r>
+              <a:rPr lang="en-US" dirty="0" smtClean="0"/>
+              <a:t> the effect of the dead time will be analyzed and investigated for both </a:t>
+            </a:r>
+            <a:r>
+              <a:rPr lang="en-US" dirty="0" err="1" smtClean="0"/>
+              <a:t>mosfet</a:t>
+            </a:r>
+            <a:r>
+              <a:rPr lang="en-US" dirty="0" smtClean="0"/>
+              <a:t> and </a:t>
+            </a:r>
+            <a:r>
+              <a:rPr lang="en-US" dirty="0" err="1" smtClean="0"/>
+              <a:t>igbt</a:t>
+            </a:r>
+            <a:r>
+              <a:rPr lang="en-US" dirty="0" smtClean="0"/>
+              <a:t> based VSI and for various PMSMs</a:t>
+            </a:r>
+          </a:p>
+          <a:p>
+            <a:pPr>
+              <a:buFont typeface="Wingdings" panose="05000000000000000000" pitchFamily="2" charset="2"/>
+              <a:buChar char="q"/>
+            </a:pPr>
+            <a:r>
+              <a:rPr lang="en-US" dirty="0" smtClean="0"/>
+              <a:t> proposed dead time compensation method will  </a:t>
+            </a:r>
+          </a:p>
+          <a:p>
+            <a:pPr lvl="1">
+              <a:buFont typeface="Wingdings" panose="05000000000000000000" pitchFamily="2" charset="2"/>
+              <a:buChar char="q"/>
+            </a:pPr>
+            <a:r>
+              <a:rPr lang="en-US" dirty="0" smtClean="0"/>
+              <a:t> be software based hence no requirement additional hardware</a:t>
+            </a:r>
+          </a:p>
+          <a:p>
+            <a:pPr lvl="1">
+              <a:buFont typeface="Wingdings" panose="05000000000000000000" pitchFamily="2" charset="2"/>
+              <a:buChar char="q"/>
+            </a:pPr>
+            <a:r>
+              <a:rPr lang="en-US" dirty="0" smtClean="0"/>
+              <a:t> not need precise current sampling especially in the zero crossing regions</a:t>
+            </a:r>
+          </a:p>
+          <a:p>
+            <a:pPr>
+              <a:buFont typeface="Wingdings" panose="05000000000000000000" pitchFamily="2" charset="2"/>
+              <a:buChar char="q"/>
+            </a:pPr>
+            <a:r>
+              <a:rPr lang="en-US" dirty="0" smtClean="0"/>
+              <a:t> the method will be integrated to the PMSM drive which is controlled by FOC algorithm </a:t>
+            </a:r>
+          </a:p>
+          <a:p>
+            <a:pPr>
+              <a:buFont typeface="Wingdings" panose="05000000000000000000" pitchFamily="2" charset="2"/>
+              <a:buChar char="q"/>
+            </a:pPr>
+            <a:r>
+              <a:rPr lang="en-US" dirty="0" smtClean="0"/>
+              <a:t> the effectiveness of the proposed method will be verified by experimental results and spectrum analysis</a:t>
+            </a:r>
+          </a:p>
+          <a:p>
+            <a:pPr>
+              <a:buFont typeface="Wingdings" panose="05000000000000000000" pitchFamily="2" charset="2"/>
+              <a:buChar char="q"/>
+            </a:pPr>
+            <a:r>
+              <a:rPr lang="en-US" dirty="0" smtClean="0"/>
+              <a:t> the waveforms of the phase, id and </a:t>
+            </a:r>
+            <a:r>
+              <a:rPr lang="en-US" dirty="0" err="1" smtClean="0"/>
+              <a:t>iq</a:t>
+            </a:r>
+            <a:r>
+              <a:rPr lang="en-US" dirty="0" smtClean="0"/>
+              <a:t> currents will be compared with and without compensation in the steady state and also during the dynamic process</a:t>
+            </a:r>
+            <a:endParaRPr lang="en-US" dirty="0"/>
+          </a:p>
+        </p:txBody>
+      </p:sp>
+    </p:spTree>
+    <p:extLst>
+      <p:ext uri="{BB962C8B-B14F-4D97-AF65-F5344CB8AC3E}">
+        <p14:creationId xmlns:p14="http://schemas.microsoft.com/office/powerpoint/2010/main" xmlns="" val="989655920"/>
+      </p:ext>
+    </p:extLst>
+  </p:cSld>
+  <p:clrMapOvr>
+    <a:masterClrMapping/>
+  </p:clrMapOvr>
+  <p:timing>
+    <p:tnLst>
+      <p:par>
+        <p:cTn id="1" dur="indefinite" restart="never" nodeType="tmRoot"/>
+      </p:par>
+    </p:tnLst>
+  </p:timing>
+</p:sld>
+</file>
+
 <file path=ppt/slides/slide2.xml><?xml version="1.0" encoding="utf-8"?>
 <p:sld xmlns:a="http://schemas.openxmlformats.org/drawingml/2006/main" xmlns:r="http://schemas.openxmlformats.org/officeDocument/2006/relationships" xmlns:p="http://schemas.openxmlformats.org/presentationml/2006/main">
   <p:cSld>
@@ -5129,7 +5876,7 @@
               <a:t>V</a:t>
             </a:r>
             <a:r>
-              <a:rPr lang="tr-TR" sz="1600" dirty="0" err="1"/>
+              <a:rPr lang="tr-TR" baseline="-25000" dirty="0" err="1"/>
               <a:t>ao</a:t>
             </a:r>
             <a:r>
@@ -5141,10 +5888,10 @@
               <a:t>V</a:t>
             </a:r>
             <a:r>
-              <a:rPr lang="tr-TR" sz="1600" dirty="0" err="1" smtClean="0"/>
+              <a:rPr lang="tr-TR" baseline="-25000" dirty="0" err="1" smtClean="0"/>
               <a:t>a</a:t>
             </a:r>
-            <a:endParaRPr lang="tr-TR" sz="1600" dirty="0" smtClean="0"/>
+            <a:endParaRPr lang="tr-TR" baseline="-25000" dirty="0" smtClean="0"/>
           </a:p>
           <a:p>
             <a:endParaRPr lang="tr-TR" sz="1600" dirty="0" smtClean="0"/>
@@ -5189,7 +5936,15 @@
                   <a:srgbClr val="000000"/>
                 </a:solidFill>
               </a:rPr>
-              <a:t>Vd</a:t>
+              <a:t>V</a:t>
+            </a:r>
+            <a:r>
+              <a:rPr lang="tr-TR" baseline="-25000" dirty="0" err="1" smtClean="0">
+                <a:solidFill>
+                  <a:srgbClr val="000000"/>
+                </a:solidFill>
+              </a:rPr>
+              <a:t>d</a:t>
             </a:r>
             <a:r>
               <a:rPr lang="tr-TR" dirty="0" smtClean="0">
@@ -5208,7 +5963,7 @@
               <a:t>t</a:t>
             </a:r>
             <a:r>
-              <a:rPr lang="tr-TR" sz="1600" dirty="0" err="1" smtClean="0">
+              <a:rPr lang="tr-TR" sz="1600" baseline="-25000" dirty="0" err="1" smtClean="0">
                 <a:solidFill>
                   <a:srgbClr val="000000"/>
                 </a:solidFill>
@@ -5216,12 +5971,20 @@
               <a:t>dead</a:t>
             </a:r>
             <a:r>
+              <a:rPr lang="tr-TR" sz="1600" baseline="-25000" dirty="0" smtClean="0">
+                <a:solidFill>
+                  <a:srgbClr val="000000"/>
+                </a:solidFill>
+              </a:rPr>
+              <a:t> </a:t>
+            </a:r>
+            <a:r>
               <a:rPr lang="tr-TR" sz="1600" dirty="0" smtClean="0">
                 <a:solidFill>
                   <a:srgbClr val="000000"/>
                 </a:solidFill>
               </a:rPr>
-              <a:t> 	(in </a:t>
+              <a:t>	(in </a:t>
             </a:r>
             <a:r>
               <a:rPr lang="tr-TR" sz="1600" dirty="0" err="1" smtClean="0">
@@ -5278,7 +6041,7 @@
               <a:t>T</a:t>
             </a:r>
             <a:r>
-              <a:rPr lang="tr-TR" dirty="0" err="1" smtClean="0"/>
+              <a:rPr lang="tr-TR" baseline="-25000" dirty="0" err="1" smtClean="0"/>
               <a:t>o</a:t>
             </a:r>
             <a:r>
@@ -5290,7 +6053,7 @@
               <a:t>f</a:t>
             </a:r>
             <a:r>
-              <a:rPr lang="tr-TR" dirty="0" err="1" smtClean="0"/>
+              <a:rPr lang="tr-TR" baseline="-25000" dirty="0" err="1" smtClean="0"/>
               <a:t>s</a:t>
             </a:r>
             <a:r>
@@ -5302,7 +6065,7 @@
               <a:t>f</a:t>
             </a:r>
             <a:r>
-              <a:rPr lang="tr-TR" dirty="0" err="1" smtClean="0"/>
+              <a:rPr lang="tr-TR" baseline="-25000" dirty="0" err="1" smtClean="0"/>
               <a:t>o</a:t>
             </a:r>
             <a:r>
@@ -5360,8 +6123,12 @@
               <a:t>f</a:t>
             </a:r>
             <a:r>
+              <a:rPr lang="tr-TR" baseline="-25000" dirty="0" smtClean="0"/>
+              <a:t>s</a:t>
+            </a:r>
+            <a:r>
               <a:rPr lang="tr-TR" dirty="0" smtClean="0"/>
-              <a:t>s </a:t>
+              <a:t> </a:t>
             </a:r>
             <a:r>
               <a:rPr lang="en-US" dirty="0" smtClean="0"/>
@@ -5543,18 +6310,7 @@
                   </a:schemeClr>
                 </a:solidFill>
               </a:rPr>
-              <a:t> </a:t>
-            </a:r>
-            <a:r>
-              <a:rPr lang="en-US" sz="2000" baseline="0" dirty="0" smtClean="0">
-                <a:solidFill>
-                  <a:schemeClr val="tx1">
-                    <a:lumMod val="75000"/>
-                    <a:lumOff val="25000"/>
-                  </a:schemeClr>
-                </a:solidFill>
-              </a:rPr>
-              <a:t>effect</a:t>
+              <a:t> effect</a:t>
             </a:r>
             <a:r>
               <a:rPr lang="en-US" sz="2000" dirty="0" smtClean="0">
@@ -5604,27 +6360,7 @@
                 <a:ea typeface="+mn-ea"/>
                 <a:cs typeface="+mn-cs"/>
               </a:rPr>
-              <a:t> </a:t>
-            </a:r>
-            <a:r>
-              <a:rPr kumimoji="0" lang="en-US" sz="2000" b="0" i="0" u="none" strike="noStrike" kern="1200" cap="none" spc="0" normalizeH="0" noProof="0" dirty="0" smtClean="0">
-                <a:ln>
-                  <a:noFill/>
-                </a:ln>
-                <a:solidFill>
-                  <a:schemeClr val="tx1">
-                    <a:lumMod val="75000"/>
-                    <a:lumOff val="25000"/>
-                  </a:schemeClr>
-                </a:solidFill>
-                <a:effectLst/>
-                <a:uLnTx/>
-                <a:uFillTx/>
-                <a:latin typeface="+mn-lt"/>
-                <a:ea typeface="+mn-ea"/>
-                <a:cs typeface="+mn-cs"/>
-              </a:rPr>
-              <a:t>output frequency </a:t>
+              <a:t> output frequency </a:t>
             </a:r>
             <a:r>
               <a:rPr kumimoji="0" lang="en-US" sz="2000" b="0" i="0" u="none" strike="noStrike" kern="1200" cap="none" spc="0" normalizeH="0" noProof="0" dirty="0" err="1" smtClean="0">
@@ -5927,17 +6663,989 @@
             </a:pPr>
             <a:r>
               <a:rPr lang="en-US" dirty="0" smtClean="0"/>
-              <a:t> analysis demonstrates that the dead-time effects mainly produce 5th</a:t>
-            </a:r>
+              <a:t> analysis demonstrates that the dead-time effects mainly produce 5</a:t>
+            </a:r>
+            <a:r>
+              <a:rPr lang="en-US" baseline="30000" dirty="0" smtClean="0"/>
+              <a:t>th</a:t>
+            </a:r>
+            <a:r>
+              <a:rPr lang="en-US" dirty="0" smtClean="0"/>
+              <a:t> and 7</a:t>
+            </a:r>
+            <a:r>
+              <a:rPr lang="en-US" baseline="30000" dirty="0" smtClean="0"/>
+              <a:t>th</a:t>
+            </a:r>
+            <a:r>
+              <a:rPr lang="en-US" dirty="0" smtClean="0"/>
+              <a:t> harmonics in the α-β reference frame and 6th voltage harmonic and its multiples in the d-q reference frame which cause current harmonics </a:t>
+            </a:r>
+          </a:p>
+          <a:p>
+            <a:pPr>
+              <a:buFont typeface="Wingdings" pitchFamily="2" charset="2"/>
+              <a:buChar char="q"/>
+            </a:pPr>
             <a:endParaRPr lang="en-US" dirty="0"/>
           </a:p>
         </p:txBody>
       </p:sp>
+      <p:pic>
+        <p:nvPicPr>
+          <p:cNvPr id="4" name="Picture 3"/>
+          <p:cNvPicPr>
+            <a:picLocks noChangeAspect="1"/>
+          </p:cNvPicPr>
+          <p:nvPr/>
+        </p:nvPicPr>
+        <p:blipFill>
+          <a:blip r:embed="rId4"/>
+          <a:stretch>
+            <a:fillRect/>
+          </a:stretch>
+        </p:blipFill>
+        <p:spPr>
+          <a:xfrm>
+            <a:off x="1308101" y="2841654"/>
+            <a:ext cx="3388070" cy="3458655"/>
+          </a:xfrm>
+          <a:prstGeom prst="rect">
+            <a:avLst/>
+          </a:prstGeom>
+        </p:spPr>
+      </p:pic>
+      <p:graphicFrame>
+        <p:nvGraphicFramePr>
+          <p:cNvPr id="5" name="Object 4"/>
+          <p:cNvGraphicFramePr>
+            <a:graphicFrameLocks noChangeAspect="1"/>
+          </p:cNvGraphicFramePr>
+          <p:nvPr>
+            <p:extLst>
+              <p:ext uri="{D42A27DB-BD31-4B8C-83A1-F6EECF244321}">
+                <p14:modId xmlns:p14="http://schemas.microsoft.com/office/powerpoint/2010/main" xmlns="" val="3584033790"/>
+              </p:ext>
+            </p:extLst>
+          </p:nvPr>
+        </p:nvGraphicFramePr>
+        <p:xfrm>
+          <a:off x="5676831" y="2991240"/>
+          <a:ext cx="2540069" cy="768804"/>
+        </p:xfrm>
+        <a:graphic>
+          <a:graphicData uri="http://schemas.openxmlformats.org/presentationml/2006/ole">
+            <p:oleObj spid="_x0000_s1026" name="Bitmap Image" r:id="rId5" imgW="3209760" imgH="971640" progId="PBrush">
+              <p:embed/>
+            </p:oleObj>
+          </a:graphicData>
+        </a:graphic>
+      </p:graphicFrame>
+      <p:pic>
+        <p:nvPicPr>
+          <p:cNvPr id="6" name="Picture 5"/>
+          <p:cNvPicPr>
+            <a:picLocks noChangeAspect="1"/>
+          </p:cNvPicPr>
+          <p:nvPr/>
+        </p:nvPicPr>
+        <p:blipFill>
+          <a:blip r:embed="rId6"/>
+          <a:stretch>
+            <a:fillRect/>
+          </a:stretch>
+        </p:blipFill>
+        <p:spPr>
+          <a:xfrm>
+            <a:off x="5343802" y="3970689"/>
+            <a:ext cx="3136927" cy="2109050"/>
+          </a:xfrm>
+          <a:prstGeom prst="rect">
+            <a:avLst/>
+          </a:prstGeom>
+        </p:spPr>
+      </p:pic>
+      <p:pic>
+        <p:nvPicPr>
+          <p:cNvPr id="7" name="Picture 6"/>
+          <p:cNvPicPr>
+            <a:picLocks noChangeAspect="1"/>
+          </p:cNvPicPr>
+          <p:nvPr/>
+        </p:nvPicPr>
+        <p:blipFill>
+          <a:blip r:embed="rId7"/>
+          <a:stretch>
+            <a:fillRect/>
+          </a:stretch>
+        </p:blipFill>
+        <p:spPr>
+          <a:xfrm>
+            <a:off x="8480729" y="3970689"/>
+            <a:ext cx="2902700" cy="2109050"/>
+          </a:xfrm>
+          <a:prstGeom prst="rect">
+            <a:avLst/>
+          </a:prstGeom>
+        </p:spPr>
+      </p:pic>
+      <p:pic>
+        <p:nvPicPr>
+          <p:cNvPr id="8" name="Picture 7"/>
+          <p:cNvPicPr>
+            <a:picLocks noChangeAspect="1"/>
+          </p:cNvPicPr>
+          <p:nvPr/>
+        </p:nvPicPr>
+        <p:blipFill>
+          <a:blip r:embed="rId8"/>
+          <a:stretch>
+            <a:fillRect/>
+          </a:stretch>
+        </p:blipFill>
+        <p:spPr>
+          <a:xfrm>
+            <a:off x="8864531" y="2988519"/>
+            <a:ext cx="2266950" cy="771525"/>
+          </a:xfrm>
+          <a:prstGeom prst="rect">
+            <a:avLst/>
+          </a:prstGeom>
+        </p:spPr>
+      </p:pic>
     </p:spTree>
   </p:cSld>
   <p:clrMapOvr>
     <a:masterClrMapping/>
   </p:clrMapOvr>
+  <p:timing>
+    <p:tnLst>
+      <p:par>
+        <p:cTn id="1" dur="indefinite" restart="never" nodeType="tmRoot"/>
+      </p:par>
+    </p:tnLst>
+  </p:timing>
+</p:sld>
+</file>
+
+<file path=ppt/slides/slide6.xml><?xml version="1.0" encoding="utf-8"?>
+<p:sld xmlns:a="http://schemas.openxmlformats.org/drawingml/2006/main" xmlns:r="http://schemas.openxmlformats.org/officeDocument/2006/relationships" xmlns:p="http://schemas.openxmlformats.org/presentationml/2006/main">
+  <p:cSld>
+    <p:spTree>
+      <p:nvGrpSpPr>
+        <p:cNvPr id="1" name=""/>
+        <p:cNvGrpSpPr/>
+        <p:nvPr/>
+      </p:nvGrpSpPr>
+      <p:grpSpPr>
+        <a:xfrm>
+          <a:off x="0" y="0"/>
+          <a:ext cx="0" cy="0"/>
+          <a:chOff x="0" y="0"/>
+          <a:chExt cx="0" cy="0"/>
+        </a:xfrm>
+      </p:grpSpPr>
+      <p:sp>
+        <p:nvSpPr>
+          <p:cNvPr id="2" name="Title 1"/>
+          <p:cNvSpPr>
+            <a:spLocks noGrp="1"/>
+          </p:cNvSpPr>
+          <p:nvPr>
+            <p:ph type="title"/>
+          </p:nvPr>
+        </p:nvSpPr>
+        <p:spPr/>
+        <p:txBody>
+          <a:bodyPr/>
+          <a:lstStyle/>
+          <a:p>
+            <a:r>
+              <a:rPr lang="en-US" dirty="0" smtClean="0"/>
+              <a:t>literature</a:t>
+            </a:r>
+            <a:endParaRPr lang="en-US" dirty="0"/>
+          </a:p>
+        </p:txBody>
+      </p:sp>
+      <p:sp>
+        <p:nvSpPr>
+          <p:cNvPr id="3" name="Content Placeholder 2"/>
+          <p:cNvSpPr>
+            <a:spLocks noGrp="1"/>
+          </p:cNvSpPr>
+          <p:nvPr>
+            <p:ph idx="1"/>
+          </p:nvPr>
+        </p:nvSpPr>
+        <p:spPr/>
+        <p:txBody>
+          <a:bodyPr/>
+          <a:lstStyle/>
+          <a:p>
+            <a:pPr>
+              <a:buFont typeface="Wingdings" panose="05000000000000000000" pitchFamily="2" charset="2"/>
+              <a:buChar char="q"/>
+            </a:pPr>
+            <a:r>
+              <a:rPr lang="en-US" dirty="0" smtClean="0"/>
+              <a:t> various compensation methods have been proposed </a:t>
+            </a:r>
+          </a:p>
+          <a:p>
+            <a:pPr lvl="1">
+              <a:buFont typeface="Wingdings" panose="05000000000000000000" pitchFamily="2" charset="2"/>
+              <a:buChar char="q"/>
+            </a:pPr>
+            <a:r>
+              <a:rPr lang="en-US" dirty="0" smtClean="0"/>
+              <a:t> hardware based</a:t>
+            </a:r>
+          </a:p>
+          <a:p>
+            <a:pPr lvl="2">
+              <a:buFont typeface="Wingdings" panose="05000000000000000000" pitchFamily="2" charset="2"/>
+              <a:buChar char="v"/>
+            </a:pPr>
+            <a:r>
+              <a:rPr lang="en-US" dirty="0" smtClean="0"/>
+              <a:t>terminal voltage is measured by analog circuitry and used as a feedback  </a:t>
+            </a:r>
+          </a:p>
+          <a:p>
+            <a:pPr lvl="1">
+              <a:buFont typeface="Wingdings" panose="05000000000000000000" pitchFamily="2" charset="2"/>
+              <a:buChar char="q"/>
+            </a:pPr>
+            <a:r>
+              <a:rPr lang="en-US" dirty="0" smtClean="0"/>
+              <a:t> software based </a:t>
+            </a:r>
+          </a:p>
+          <a:p>
+            <a:pPr lvl="2">
+              <a:buFont typeface="Wingdings" panose="05000000000000000000" pitchFamily="2" charset="2"/>
+              <a:buChar char="q"/>
+            </a:pPr>
+            <a:r>
+              <a:rPr lang="en-US" dirty="0" smtClean="0"/>
+              <a:t>current harmonic analysis based method</a:t>
+            </a:r>
+          </a:p>
+          <a:p>
+            <a:pPr lvl="3">
+              <a:buFont typeface="Wingdings" panose="05000000000000000000" pitchFamily="2" charset="2"/>
+              <a:buChar char="v"/>
+            </a:pPr>
+            <a:r>
+              <a:rPr lang="en-US" dirty="0" smtClean="0"/>
+              <a:t>based on monitoring harmonic distortion in the d-axis current</a:t>
+            </a:r>
+          </a:p>
+          <a:p>
+            <a:pPr lvl="2">
+              <a:buFont typeface="Wingdings" panose="05000000000000000000" pitchFamily="2" charset="2"/>
+              <a:buChar char="q"/>
+            </a:pPr>
+            <a:r>
+              <a:rPr lang="en-US" dirty="0" smtClean="0"/>
+              <a:t>estimator based method</a:t>
+            </a:r>
+          </a:p>
+          <a:p>
+            <a:pPr lvl="3">
+              <a:buFont typeface="Wingdings" panose="05000000000000000000" pitchFamily="2" charset="2"/>
+              <a:buChar char="v"/>
+            </a:pPr>
+            <a:r>
+              <a:rPr lang="en-US" dirty="0" smtClean="0"/>
+              <a:t>estimators (or observers) are designed to extract the disturbance voltage based on the motor model</a:t>
+            </a:r>
+          </a:p>
+          <a:p>
+            <a:pPr lvl="2">
+              <a:buFont typeface="Wingdings" panose="05000000000000000000" pitchFamily="2" charset="2"/>
+              <a:buChar char="q"/>
+            </a:pPr>
+            <a:r>
+              <a:rPr lang="en-US" dirty="0" smtClean="0"/>
+              <a:t>instantaneous average  voltage method</a:t>
+            </a:r>
+          </a:p>
+          <a:p>
+            <a:pPr lvl="3">
+              <a:buFont typeface="Wingdings" panose="05000000000000000000" pitchFamily="2" charset="2"/>
+              <a:buChar char="v"/>
+            </a:pPr>
+            <a:r>
+              <a:rPr lang="en-US" dirty="0" smtClean="0"/>
+              <a:t>compensate the average voltage error between reference voltage and actual voltage in each switching period</a:t>
+            </a:r>
+          </a:p>
+          <a:p>
+            <a:pPr lvl="2">
+              <a:buFont typeface="Wingdings" panose="05000000000000000000" pitchFamily="2" charset="2"/>
+              <a:buChar char="q"/>
+            </a:pPr>
+            <a:endParaRPr lang="en-US" dirty="0"/>
+          </a:p>
+        </p:txBody>
+      </p:sp>
+    </p:spTree>
+    <p:extLst>
+      <p:ext uri="{BB962C8B-B14F-4D97-AF65-F5344CB8AC3E}">
+        <p14:creationId xmlns:p14="http://schemas.microsoft.com/office/powerpoint/2010/main" xmlns="" val="914271857"/>
+      </p:ext>
+    </p:extLst>
+  </p:cSld>
+  <p:clrMapOvr>
+    <a:masterClrMapping/>
+  </p:clrMapOvr>
+  <p:timing>
+    <p:tnLst>
+      <p:par>
+        <p:cTn id="1" dur="indefinite" restart="never" nodeType="tmRoot"/>
+      </p:par>
+    </p:tnLst>
+  </p:timing>
+</p:sld>
+</file>
+
+<file path=ppt/slides/slide7.xml><?xml version="1.0" encoding="utf-8"?>
+<p:sld xmlns:a="http://schemas.openxmlformats.org/drawingml/2006/main" xmlns:r="http://schemas.openxmlformats.org/officeDocument/2006/relationships" xmlns:p="http://schemas.openxmlformats.org/presentationml/2006/main">
+  <p:cSld>
+    <p:spTree>
+      <p:nvGrpSpPr>
+        <p:cNvPr id="1" name=""/>
+        <p:cNvGrpSpPr/>
+        <p:nvPr/>
+      </p:nvGrpSpPr>
+      <p:grpSpPr>
+        <a:xfrm>
+          <a:off x="0" y="0"/>
+          <a:ext cx="0" cy="0"/>
+          <a:chOff x="0" y="0"/>
+          <a:chExt cx="0" cy="0"/>
+        </a:xfrm>
+      </p:grpSpPr>
+      <p:sp>
+        <p:nvSpPr>
+          <p:cNvPr id="2" name="Title 1"/>
+          <p:cNvSpPr>
+            <a:spLocks noGrp="1"/>
+          </p:cNvSpPr>
+          <p:nvPr>
+            <p:ph type="title"/>
+          </p:nvPr>
+        </p:nvSpPr>
+        <p:spPr/>
+        <p:txBody>
+          <a:bodyPr/>
+          <a:lstStyle/>
+          <a:p>
+            <a:r>
+              <a:rPr lang="en-US" dirty="0" smtClean="0"/>
+              <a:t>literature</a:t>
+            </a:r>
+            <a:endParaRPr lang="en-US" dirty="0"/>
+          </a:p>
+        </p:txBody>
+      </p:sp>
+      <p:sp>
+        <p:nvSpPr>
+          <p:cNvPr id="3" name="Content Placeholder 2"/>
+          <p:cNvSpPr>
+            <a:spLocks noGrp="1"/>
+          </p:cNvSpPr>
+          <p:nvPr>
+            <p:ph idx="1"/>
+          </p:nvPr>
+        </p:nvSpPr>
+        <p:spPr/>
+        <p:txBody>
+          <a:bodyPr/>
+          <a:lstStyle/>
+          <a:p>
+            <a:pPr>
+              <a:buFont typeface="Wingdings" panose="05000000000000000000" pitchFamily="2" charset="2"/>
+              <a:buChar char="q"/>
+            </a:pPr>
+            <a:r>
+              <a:rPr lang="en-US" dirty="0" smtClean="0"/>
+              <a:t> an example of hardware based compensation method</a:t>
+            </a:r>
+            <a:endParaRPr lang="en-US" dirty="0"/>
+          </a:p>
+        </p:txBody>
+      </p:sp>
+      <p:pic>
+        <p:nvPicPr>
+          <p:cNvPr id="4" name="Picture 3"/>
+          <p:cNvPicPr>
+            <a:picLocks noChangeAspect="1"/>
+          </p:cNvPicPr>
+          <p:nvPr/>
+        </p:nvPicPr>
+        <p:blipFill>
+          <a:blip r:embed="rId3"/>
+          <a:stretch>
+            <a:fillRect/>
+          </a:stretch>
+        </p:blipFill>
+        <p:spPr>
+          <a:xfrm>
+            <a:off x="386760" y="4679249"/>
+            <a:ext cx="1549784" cy="1580172"/>
+          </a:xfrm>
+          <a:prstGeom prst="rect">
+            <a:avLst/>
+          </a:prstGeom>
+        </p:spPr>
+      </p:pic>
+      <p:pic>
+        <p:nvPicPr>
+          <p:cNvPr id="6" name="Picture 5"/>
+          <p:cNvPicPr>
+            <a:picLocks noChangeAspect="1"/>
+          </p:cNvPicPr>
+          <p:nvPr/>
+        </p:nvPicPr>
+        <p:blipFill>
+          <a:blip r:embed="rId4"/>
+          <a:stretch>
+            <a:fillRect/>
+          </a:stretch>
+        </p:blipFill>
+        <p:spPr>
+          <a:xfrm>
+            <a:off x="7773148" y="2279244"/>
+            <a:ext cx="3821112" cy="2536903"/>
+          </a:xfrm>
+          <a:prstGeom prst="rect">
+            <a:avLst/>
+          </a:prstGeom>
+        </p:spPr>
+      </p:pic>
+      <p:pic>
+        <p:nvPicPr>
+          <p:cNvPr id="8" name="Picture 7"/>
+          <p:cNvPicPr>
+            <a:picLocks noChangeAspect="1"/>
+          </p:cNvPicPr>
+          <p:nvPr/>
+        </p:nvPicPr>
+        <p:blipFill>
+          <a:blip r:embed="rId5"/>
+          <a:stretch>
+            <a:fillRect/>
+          </a:stretch>
+        </p:blipFill>
+        <p:spPr>
+          <a:xfrm>
+            <a:off x="2752534" y="2228444"/>
+            <a:ext cx="4595648" cy="2737256"/>
+          </a:xfrm>
+          <a:prstGeom prst="rect">
+            <a:avLst/>
+          </a:prstGeom>
+        </p:spPr>
+      </p:pic>
+      <p:pic>
+        <p:nvPicPr>
+          <p:cNvPr id="10" name="Picture 9"/>
+          <p:cNvPicPr>
+            <a:picLocks noChangeAspect="1"/>
+          </p:cNvPicPr>
+          <p:nvPr/>
+        </p:nvPicPr>
+        <p:blipFill>
+          <a:blip r:embed="rId6"/>
+          <a:stretch>
+            <a:fillRect/>
+          </a:stretch>
+        </p:blipFill>
+        <p:spPr>
+          <a:xfrm>
+            <a:off x="8486814" y="4816147"/>
+            <a:ext cx="2668866" cy="1486457"/>
+          </a:xfrm>
+          <a:prstGeom prst="rect">
+            <a:avLst/>
+          </a:prstGeom>
+        </p:spPr>
+      </p:pic>
+      <p:pic>
+        <p:nvPicPr>
+          <p:cNvPr id="11" name="Picture 10"/>
+          <p:cNvPicPr>
+            <a:picLocks noChangeAspect="1"/>
+          </p:cNvPicPr>
+          <p:nvPr/>
+        </p:nvPicPr>
+        <p:blipFill>
+          <a:blip r:embed="rId7"/>
+          <a:stretch>
+            <a:fillRect/>
+          </a:stretch>
+        </p:blipFill>
+        <p:spPr>
+          <a:xfrm>
+            <a:off x="241189" y="2236061"/>
+            <a:ext cx="1841585" cy="2287387"/>
+          </a:xfrm>
+          <a:prstGeom prst="rect">
+            <a:avLst/>
+          </a:prstGeom>
+        </p:spPr>
+      </p:pic>
+      <p:pic>
+        <p:nvPicPr>
+          <p:cNvPr id="12" name="Picture 11"/>
+          <p:cNvPicPr>
+            <a:picLocks noChangeAspect="1"/>
+          </p:cNvPicPr>
+          <p:nvPr/>
+        </p:nvPicPr>
+        <p:blipFill>
+          <a:blip r:embed="rId8"/>
+          <a:stretch>
+            <a:fillRect/>
+          </a:stretch>
+        </p:blipFill>
+        <p:spPr>
+          <a:xfrm>
+            <a:off x="3591798" y="4843614"/>
+            <a:ext cx="2641024" cy="1415807"/>
+          </a:xfrm>
+          <a:prstGeom prst="rect">
+            <a:avLst/>
+          </a:prstGeom>
+        </p:spPr>
+      </p:pic>
+    </p:spTree>
+    <p:extLst>
+      <p:ext uri="{BB962C8B-B14F-4D97-AF65-F5344CB8AC3E}">
+        <p14:creationId xmlns:p14="http://schemas.microsoft.com/office/powerpoint/2010/main" xmlns="" val="270053531"/>
+      </p:ext>
+    </p:extLst>
+  </p:cSld>
+  <p:clrMapOvr>
+    <a:masterClrMapping/>
+  </p:clrMapOvr>
+  <p:timing>
+    <p:tnLst>
+      <p:par>
+        <p:cTn id="1" dur="indefinite" restart="never" nodeType="tmRoot"/>
+      </p:par>
+    </p:tnLst>
+  </p:timing>
+</p:sld>
+</file>
+
+<file path=ppt/slides/slide8.xml><?xml version="1.0" encoding="utf-8"?>
+<p:sld xmlns:a="http://schemas.openxmlformats.org/drawingml/2006/main" xmlns:r="http://schemas.openxmlformats.org/officeDocument/2006/relationships" xmlns:p="http://schemas.openxmlformats.org/presentationml/2006/main">
+  <p:cSld>
+    <p:spTree>
+      <p:nvGrpSpPr>
+        <p:cNvPr id="1" name=""/>
+        <p:cNvGrpSpPr/>
+        <p:nvPr/>
+      </p:nvGrpSpPr>
+      <p:grpSpPr>
+        <a:xfrm>
+          <a:off x="0" y="0"/>
+          <a:ext cx="0" cy="0"/>
+          <a:chOff x="0" y="0"/>
+          <a:chExt cx="0" cy="0"/>
+        </a:xfrm>
+      </p:grpSpPr>
+      <p:sp>
+        <p:nvSpPr>
+          <p:cNvPr id="2" name="Title 1"/>
+          <p:cNvSpPr>
+            <a:spLocks noGrp="1"/>
+          </p:cNvSpPr>
+          <p:nvPr>
+            <p:ph type="title"/>
+          </p:nvPr>
+        </p:nvSpPr>
+        <p:spPr/>
+        <p:txBody>
+          <a:bodyPr/>
+          <a:lstStyle/>
+          <a:p>
+            <a:r>
+              <a:rPr lang="en-US" dirty="0" smtClean="0"/>
+              <a:t>literature</a:t>
+            </a:r>
+            <a:endParaRPr lang="en-US" dirty="0"/>
+          </a:p>
+        </p:txBody>
+      </p:sp>
+      <p:sp>
+        <p:nvSpPr>
+          <p:cNvPr id="3" name="Content Placeholder 2"/>
+          <p:cNvSpPr>
+            <a:spLocks noGrp="1"/>
+          </p:cNvSpPr>
+          <p:nvPr>
+            <p:ph idx="1"/>
+          </p:nvPr>
+        </p:nvSpPr>
+        <p:spPr/>
+        <p:txBody>
+          <a:bodyPr/>
+          <a:lstStyle/>
+          <a:p>
+            <a:pPr>
+              <a:buFont typeface="Wingdings" panose="05000000000000000000" pitchFamily="2" charset="2"/>
+              <a:buChar char="q"/>
+            </a:pPr>
+            <a:r>
+              <a:rPr lang="en-US" dirty="0" smtClean="0"/>
+              <a:t> an example of software based compensation method (revised repetitive controller RRC)</a:t>
+            </a:r>
+          </a:p>
+          <a:p>
+            <a:pPr>
+              <a:buFont typeface="Wingdings" panose="05000000000000000000" pitchFamily="2" charset="2"/>
+              <a:buChar char="q"/>
+            </a:pPr>
+            <a:endParaRPr lang="en-US" dirty="0"/>
+          </a:p>
+        </p:txBody>
+      </p:sp>
+      <p:pic>
+        <p:nvPicPr>
+          <p:cNvPr id="4" name="Picture 3"/>
+          <p:cNvPicPr>
+            <a:picLocks noChangeAspect="1"/>
+          </p:cNvPicPr>
+          <p:nvPr/>
+        </p:nvPicPr>
+        <p:blipFill>
+          <a:blip r:embed="rId2"/>
+          <a:stretch>
+            <a:fillRect/>
+          </a:stretch>
+        </p:blipFill>
+        <p:spPr>
+          <a:xfrm>
+            <a:off x="101600" y="2453100"/>
+            <a:ext cx="5008880" cy="3415994"/>
+          </a:xfrm>
+          <a:prstGeom prst="rect">
+            <a:avLst/>
+          </a:prstGeom>
+        </p:spPr>
+      </p:pic>
+      <p:pic>
+        <p:nvPicPr>
+          <p:cNvPr id="5" name="Picture 4"/>
+          <p:cNvPicPr>
+            <a:picLocks noChangeAspect="1"/>
+          </p:cNvPicPr>
+          <p:nvPr/>
+        </p:nvPicPr>
+        <p:blipFill>
+          <a:blip r:embed="rId3"/>
+          <a:stretch>
+            <a:fillRect/>
+          </a:stretch>
+        </p:blipFill>
+        <p:spPr>
+          <a:xfrm>
+            <a:off x="4996180" y="2702031"/>
+            <a:ext cx="3515517" cy="3167063"/>
+          </a:xfrm>
+          <a:prstGeom prst="rect">
+            <a:avLst/>
+          </a:prstGeom>
+        </p:spPr>
+      </p:pic>
+      <p:pic>
+        <p:nvPicPr>
+          <p:cNvPr id="6" name="Picture 5"/>
+          <p:cNvPicPr>
+            <a:picLocks noChangeAspect="1"/>
+          </p:cNvPicPr>
+          <p:nvPr/>
+        </p:nvPicPr>
+        <p:blipFill>
+          <a:blip r:embed="rId4"/>
+          <a:stretch>
+            <a:fillRect/>
+          </a:stretch>
+        </p:blipFill>
+        <p:spPr>
+          <a:xfrm>
+            <a:off x="8420590" y="2778231"/>
+            <a:ext cx="3857769" cy="3090863"/>
+          </a:xfrm>
+          <a:prstGeom prst="rect">
+            <a:avLst/>
+          </a:prstGeom>
+        </p:spPr>
+      </p:pic>
+    </p:spTree>
+    <p:extLst>
+      <p:ext uri="{BB962C8B-B14F-4D97-AF65-F5344CB8AC3E}">
+        <p14:creationId xmlns:p14="http://schemas.microsoft.com/office/powerpoint/2010/main" xmlns="" val="1233765601"/>
+      </p:ext>
+    </p:extLst>
+  </p:cSld>
+  <p:clrMapOvr>
+    <a:masterClrMapping/>
+  </p:clrMapOvr>
+  <p:timing>
+    <p:tnLst>
+      <p:par>
+        <p:cTn id="1" dur="indefinite" restart="never" nodeType="tmRoot"/>
+      </p:par>
+    </p:tnLst>
+  </p:timing>
+</p:sld>
+</file>
+
+<file path=ppt/slides/slide9.xml><?xml version="1.0" encoding="utf-8"?>
+<p:sld xmlns:a="http://schemas.openxmlformats.org/drawingml/2006/main" xmlns:r="http://schemas.openxmlformats.org/officeDocument/2006/relationships" xmlns:p="http://schemas.openxmlformats.org/presentationml/2006/main">
+  <p:cSld>
+    <p:spTree>
+      <p:nvGrpSpPr>
+        <p:cNvPr id="1" name=""/>
+        <p:cNvGrpSpPr/>
+        <p:nvPr/>
+      </p:nvGrpSpPr>
+      <p:grpSpPr>
+        <a:xfrm>
+          <a:off x="0" y="0"/>
+          <a:ext cx="0" cy="0"/>
+          <a:chOff x="0" y="0"/>
+          <a:chExt cx="0" cy="0"/>
+        </a:xfrm>
+      </p:grpSpPr>
+      <p:pic>
+        <p:nvPicPr>
+          <p:cNvPr id="11" name="Picture 10"/>
+          <p:cNvPicPr>
+            <a:picLocks noChangeAspect="1"/>
+          </p:cNvPicPr>
+          <p:nvPr/>
+        </p:nvPicPr>
+        <p:blipFill>
+          <a:blip r:embed="rId3"/>
+          <a:stretch>
+            <a:fillRect/>
+          </a:stretch>
+        </p:blipFill>
+        <p:spPr>
+          <a:xfrm>
+            <a:off x="6832537" y="4490976"/>
+            <a:ext cx="2436215" cy="1770063"/>
+          </a:xfrm>
+          <a:prstGeom prst="rect">
+            <a:avLst/>
+          </a:prstGeom>
+        </p:spPr>
+      </p:pic>
+      <p:pic>
+        <p:nvPicPr>
+          <p:cNvPr id="12" name="Picture 11"/>
+          <p:cNvPicPr>
+            <a:picLocks noChangeAspect="1"/>
+          </p:cNvPicPr>
+          <p:nvPr/>
+        </p:nvPicPr>
+        <p:blipFill>
+          <a:blip r:embed="rId4"/>
+          <a:stretch>
+            <a:fillRect/>
+          </a:stretch>
+        </p:blipFill>
+        <p:spPr>
+          <a:xfrm>
+            <a:off x="9559957" y="4434303"/>
+            <a:ext cx="2378043" cy="1883410"/>
+          </a:xfrm>
+          <a:prstGeom prst="rect">
+            <a:avLst/>
+          </a:prstGeom>
+        </p:spPr>
+      </p:pic>
+      <p:pic>
+        <p:nvPicPr>
+          <p:cNvPr id="10" name="Picture 9"/>
+          <p:cNvPicPr>
+            <a:picLocks noChangeAspect="1"/>
+          </p:cNvPicPr>
+          <p:nvPr/>
+        </p:nvPicPr>
+        <p:blipFill>
+          <a:blip r:embed="rId5"/>
+          <a:stretch>
+            <a:fillRect/>
+          </a:stretch>
+        </p:blipFill>
+        <p:spPr>
+          <a:xfrm>
+            <a:off x="6887700" y="2057400"/>
+            <a:ext cx="4012955" cy="2427702"/>
+          </a:xfrm>
+          <a:prstGeom prst="rect">
+            <a:avLst/>
+          </a:prstGeom>
+        </p:spPr>
+      </p:pic>
+      <p:sp>
+        <p:nvSpPr>
+          <p:cNvPr id="2" name="Title 1"/>
+          <p:cNvSpPr>
+            <a:spLocks noGrp="1"/>
+          </p:cNvSpPr>
+          <p:nvPr>
+            <p:ph type="title"/>
+          </p:nvPr>
+        </p:nvSpPr>
+        <p:spPr/>
+        <p:txBody>
+          <a:bodyPr/>
+          <a:lstStyle/>
+          <a:p>
+            <a:r>
+              <a:rPr lang="en-US" dirty="0" smtClean="0"/>
+              <a:t>literature</a:t>
+            </a:r>
+            <a:endParaRPr lang="en-US" dirty="0"/>
+          </a:p>
+        </p:txBody>
+      </p:sp>
+      <p:sp>
+        <p:nvSpPr>
+          <p:cNvPr id="3" name="Content Placeholder 2"/>
+          <p:cNvSpPr>
+            <a:spLocks noGrp="1"/>
+          </p:cNvSpPr>
+          <p:nvPr>
+            <p:ph idx="1"/>
+          </p:nvPr>
+        </p:nvSpPr>
+        <p:spPr>
+          <a:xfrm>
+            <a:off x="1097280" y="1845734"/>
+            <a:ext cx="10370820" cy="4023360"/>
+          </a:xfrm>
+        </p:spPr>
+        <p:txBody>
+          <a:bodyPr/>
+          <a:lstStyle/>
+          <a:p>
+            <a:pPr>
+              <a:buFont typeface="Wingdings" panose="05000000000000000000" pitchFamily="2" charset="2"/>
+              <a:buChar char="q"/>
+            </a:pPr>
+            <a:r>
+              <a:rPr lang="en-US" dirty="0" smtClean="0"/>
+              <a:t> an example of software based compensation method (revised repetitive controller RRC) (cont’d)</a:t>
+            </a:r>
+          </a:p>
+          <a:p>
+            <a:pPr>
+              <a:buFont typeface="Wingdings" panose="05000000000000000000" pitchFamily="2" charset="2"/>
+              <a:buChar char="q"/>
+            </a:pPr>
+            <a:endParaRPr lang="en-US" dirty="0"/>
+          </a:p>
+        </p:txBody>
+      </p:sp>
+      <p:pic>
+        <p:nvPicPr>
+          <p:cNvPr id="7" name="Picture 6"/>
+          <p:cNvPicPr>
+            <a:picLocks noChangeAspect="1"/>
+          </p:cNvPicPr>
+          <p:nvPr/>
+        </p:nvPicPr>
+        <p:blipFill>
+          <a:blip r:embed="rId6"/>
+          <a:stretch>
+            <a:fillRect/>
+          </a:stretch>
+        </p:blipFill>
+        <p:spPr>
+          <a:xfrm>
+            <a:off x="174270" y="2881312"/>
+            <a:ext cx="2540989" cy="2302290"/>
+          </a:xfrm>
+          <a:prstGeom prst="rect">
+            <a:avLst/>
+          </a:prstGeom>
+        </p:spPr>
+      </p:pic>
+      <p:pic>
+        <p:nvPicPr>
+          <p:cNvPr id="8" name="Picture 7"/>
+          <p:cNvPicPr>
+            <a:picLocks noChangeAspect="1"/>
+          </p:cNvPicPr>
+          <p:nvPr/>
+        </p:nvPicPr>
+        <p:blipFill>
+          <a:blip r:embed="rId7"/>
+          <a:stretch>
+            <a:fillRect/>
+          </a:stretch>
+        </p:blipFill>
+        <p:spPr>
+          <a:xfrm>
+            <a:off x="3504636" y="4622732"/>
+            <a:ext cx="2882901" cy="1673489"/>
+          </a:xfrm>
+          <a:prstGeom prst="rect">
+            <a:avLst/>
+          </a:prstGeom>
+        </p:spPr>
+      </p:pic>
+      <p:pic>
+        <p:nvPicPr>
+          <p:cNvPr id="9" name="Picture 8"/>
+          <p:cNvPicPr>
+            <a:picLocks noChangeAspect="1"/>
+          </p:cNvPicPr>
+          <p:nvPr/>
+        </p:nvPicPr>
+        <p:blipFill>
+          <a:blip r:embed="rId8"/>
+          <a:stretch>
+            <a:fillRect/>
+          </a:stretch>
+        </p:blipFill>
+        <p:spPr>
+          <a:xfrm>
+            <a:off x="2940821" y="2167352"/>
+            <a:ext cx="3936171" cy="2381250"/>
+          </a:xfrm>
+          <a:prstGeom prst="rect">
+            <a:avLst/>
+          </a:prstGeom>
+        </p:spPr>
+      </p:pic>
+    </p:spTree>
+    <p:extLst>
+      <p:ext uri="{BB962C8B-B14F-4D97-AF65-F5344CB8AC3E}">
+        <p14:creationId xmlns:p14="http://schemas.microsoft.com/office/powerpoint/2010/main" xmlns="" val="472826320"/>
+      </p:ext>
+    </p:extLst>
+  </p:cSld>
+  <p:clrMapOvr>
+    <a:masterClrMapping/>
+  </p:clrMapOvr>
+  <p:timing>
+    <p:tnLst>
+      <p:par>
+        <p:cTn id="1" dur="indefinite" restart="never" nodeType="tmRoot"/>
+      </p:par>
+    </p:tnLst>
+  </p:timing>
 </p:sld>
 </file>
 
@@ -6218,7 +7926,7 @@
   <a:extraClrSchemeLst/>
   <a:extLst>
     <a:ext uri="{05A4C25C-085E-4340-85A3-A5531E510DB2}">
-      <thm15:themeFamily xmlns:thm15="http://schemas.microsoft.com/office/thememl/2012/main" xmlns="" name="Retrospect" id="{5F128B03-DCCA-4EEB-AB3B-CF2899314A46}" vid="{3F1AAB62-24C6-49D2-8E01-B56FAC9A3DCD}"/>
+      <thm15:themeFamily xmlns="" xmlns:thm15="http://schemas.microsoft.com/office/thememl/2012/main" name="Retrospect" id="{5F128B03-DCCA-4EEB-AB3B-CF2899314A46}" vid="{3F1AAB62-24C6-49D2-8E01-B56FAC9A3DCD}"/>
     </a:ext>
   </a:extLst>
 </a:theme>
@@ -6479,7 +8187,7 @@
   <a:extraClrSchemeLst/>
   <a:extLst>
     <a:ext uri="{05A4C25C-085E-4340-85A3-A5531E510DB2}">
-      <thm15:themeFamily xmlns:thm15="http://schemas.microsoft.com/office/thememl/2012/main" xmlns="" name="Office Theme" id="{62F939B6-93AF-4DB8-9C6B-D6C7DFDC589F}" vid="{4A3C46E8-61CC-4603-A589-7422A47A8E4A}"/>
+      <thm15:themeFamily xmlns="" xmlns:thm15="http://schemas.microsoft.com/office/thememl/2012/main" name="Office Theme" id="{62F939B6-93AF-4DB8-9C6B-D6C7DFDC589F}" vid="{4A3C46E8-61CC-4603-A589-7422A47A8E4A}"/>
     </a:ext>
   </a:extLst>
 </a:theme>

</xml_diff>